<commit_message>
updated SBOLv COMBINE slides
</commit_message>
<xml_diff>
--- a/2017/COMBINE 2017/SBOLv-update-2017.pptx
+++ b/2017/COMBINE 2017/SBOLv-update-2017.pptx
@@ -5,10 +5,10 @@
     <p:sldMasterId id="2147483660" r:id="rId1"/>
   </p:sldMasterIdLst>
   <p:notesMasterIdLst>
-    <p:notesMasterId r:id="rId13"/>
+    <p:notesMasterId r:id="rId15"/>
   </p:notesMasterIdLst>
   <p:handoutMasterIdLst>
-    <p:handoutMasterId r:id="rId14"/>
+    <p:handoutMasterId r:id="rId16"/>
   </p:handoutMasterIdLst>
   <p:sldIdLst>
     <p:sldId id="333" r:id="rId2"/>
@@ -21,7 +21,9 @@
     <p:sldId id="339" r:id="rId9"/>
     <p:sldId id="340" r:id="rId10"/>
     <p:sldId id="341" r:id="rId11"/>
-    <p:sldId id="343" r:id="rId12"/>
+    <p:sldId id="346" r:id="rId12"/>
+    <p:sldId id="344" r:id="rId13"/>
+    <p:sldId id="343" r:id="rId14"/>
   </p:sldIdLst>
   <p:sldSz cx="9144000" cy="6858000" type="screen4x3"/>
   <p:notesSz cx="6858000" cy="9144000"/>
@@ -221,7 +223,7 @@
           <a:p>
             <a:fld id="{9BCACCAD-939A-534B-BD3C-7263FE43D5A1}" type="datetimeFigureOut">
               <a:rPr lang="en-US" smtClean="0"/>
-              <a:t>10/5/17</a:t>
+              <a:t>10/12/17</a:t>
             </a:fld>
             <a:endParaRPr lang="en-US"/>
           </a:p>
@@ -388,7 +390,7 @@
             <a:fld id="{7D0468E1-02D2-4C4B-B9A7-6C361D2976BF}" type="datetimeFigureOut">
               <a:rPr lang="en-US" smtClean="0"/>
               <a:pPr/>
-              <a:t>10/5/17</a:t>
+              <a:t>10/12/17</a:t>
             </a:fld>
             <a:endParaRPr lang="en-US"/>
           </a:p>
@@ -701,6 +703,91 @@
         </p:nvSpPr>
         <p:spPr/>
         <p:txBody>
+          <a:bodyPr/>
+          <a:lstStyle/>
+          <a:p>
+            <a:endParaRPr lang="en-US" dirty="0"/>
+          </a:p>
+        </p:txBody>
+      </p:sp>
+      <p:sp>
+        <p:nvSpPr>
+          <p:cNvPr id="4" name="Slide Number Placeholder 3"/>
+          <p:cNvSpPr>
+            <a:spLocks noGrp="1"/>
+          </p:cNvSpPr>
+          <p:nvPr>
+            <p:ph type="sldNum" sz="quarter" idx="10"/>
+          </p:nvPr>
+        </p:nvSpPr>
+        <p:spPr/>
+        <p:txBody>
+          <a:bodyPr/>
+          <a:lstStyle/>
+          <a:p>
+            <a:fld id="{B06EBDFA-F686-8442-832D-72D2A1F29BE7}" type="slidenum">
+              <a:rPr lang="en-US" smtClean="0"/>
+              <a:pPr/>
+              <a:t>1</a:t>
+            </a:fld>
+            <a:endParaRPr lang="en-US"/>
+          </a:p>
+        </p:txBody>
+      </p:sp>
+    </p:spTree>
+    <p:extLst>
+      <p:ext uri="{BB962C8B-B14F-4D97-AF65-F5344CB8AC3E}">
+        <p14:creationId xmlns:p14="http://schemas.microsoft.com/office/powerpoint/2010/main" val="895379370"/>
+      </p:ext>
+    </p:extLst>
+  </p:cSld>
+  <p:clrMapOvr>
+    <a:masterClrMapping/>
+  </p:clrMapOvr>
+</p:notes>
+</file>
+
+<file path=ppt/notesSlides/notesSlide2.xml><?xml version="1.0" encoding="utf-8"?>
+<p:notes xmlns:a="http://schemas.openxmlformats.org/drawingml/2006/main" xmlns:r="http://schemas.openxmlformats.org/officeDocument/2006/relationships" xmlns:p="http://schemas.openxmlformats.org/presentationml/2006/main">
+  <p:cSld>
+    <p:spTree>
+      <p:nvGrpSpPr>
+        <p:cNvPr id="1" name=""/>
+        <p:cNvGrpSpPr/>
+        <p:nvPr/>
+      </p:nvGrpSpPr>
+      <p:grpSpPr>
+        <a:xfrm>
+          <a:off x="0" y="0"/>
+          <a:ext cx="0" cy="0"/>
+          <a:chOff x="0" y="0"/>
+          <a:chExt cx="0" cy="0"/>
+        </a:xfrm>
+      </p:grpSpPr>
+      <p:sp>
+        <p:nvSpPr>
+          <p:cNvPr id="2" name="Slide Image Placeholder 1"/>
+          <p:cNvSpPr>
+            <a:spLocks noGrp="1" noRot="1" noChangeAspect="1"/>
+          </p:cNvSpPr>
+          <p:nvPr>
+            <p:ph type="sldImg"/>
+          </p:nvPr>
+        </p:nvSpPr>
+        <p:spPr/>
+      </p:sp>
+      <p:sp>
+        <p:nvSpPr>
+          <p:cNvPr id="3" name="Notes Placeholder 2"/>
+          <p:cNvSpPr>
+            <a:spLocks noGrp="1"/>
+          </p:cNvSpPr>
+          <p:nvPr>
+            <p:ph type="body" idx="1"/>
+          </p:nvPr>
+        </p:nvSpPr>
+        <p:spPr/>
+        <p:txBody>
           <a:bodyPr>
             <a:normAutofit/>
           </a:bodyPr>
@@ -758,7 +845,7 @@
 </p:notes>
 </file>
 
-<file path=ppt/notesSlides/notesSlide2.xml><?xml version="1.0" encoding="utf-8"?>
+<file path=ppt/notesSlides/notesSlide3.xml><?xml version="1.0" encoding="utf-8"?>
 <p:notes xmlns:a="http://schemas.openxmlformats.org/drawingml/2006/main" xmlns:r="http://schemas.openxmlformats.org/officeDocument/2006/relationships" xmlns:p="http://schemas.openxmlformats.org/presentationml/2006/main">
   <p:cSld>
     <p:spTree>
@@ -1031,7 +1118,7 @@
             </a:pPr>
             <a:fld id="{7F1D900E-0B2A-F845-86FB-799BCAC97C3D}" type="datetime1">
               <a:rPr lang="en-US" smtClean="0"/>
-              <a:t>10/5/17</a:t>
+              <a:t>10/12/17</a:t>
             </a:fld>
             <a:endParaRPr lang="en-US"/>
           </a:p>
@@ -1223,7 +1310,7 @@
             </a:pPr>
             <a:fld id="{84F89B29-8564-8A43-82B6-4508FD7E3A4C}" type="datetime1">
               <a:rPr lang="en-US" smtClean="0"/>
-              <a:t>10/5/17</a:t>
+              <a:t>10/12/17</a:t>
             </a:fld>
             <a:endParaRPr lang="en-US"/>
           </a:p>
@@ -1426,7 +1513,7 @@
             </a:pPr>
             <a:fld id="{A53D2B62-FC1B-D744-A546-D53D83C2D35B}" type="datetime1">
               <a:rPr lang="en-US" smtClean="0"/>
-              <a:t>10/5/17</a:t>
+              <a:t>10/12/17</a:t>
             </a:fld>
             <a:endParaRPr lang="en-US"/>
           </a:p>
@@ -1619,7 +1706,7 @@
             </a:pPr>
             <a:fld id="{F78EA7C1-0A85-4A4B-8A4B-85E9C740D835}" type="datetime1">
               <a:rPr lang="en-US" smtClean="0"/>
-              <a:t>10/5/17</a:t>
+              <a:t>10/12/17</a:t>
             </a:fld>
             <a:endParaRPr lang="en-US"/>
           </a:p>
@@ -1887,7 +1974,7 @@
             </a:pPr>
             <a:fld id="{220F310F-DC71-A74E-8091-1EB90F581A43}" type="datetime1">
               <a:rPr lang="en-US" smtClean="0"/>
-              <a:t>10/5/17</a:t>
+              <a:t>10/12/17</a:t>
             </a:fld>
             <a:endParaRPr lang="en-US"/>
           </a:p>
@@ -2198,7 +2285,7 @@
             </a:pPr>
             <a:fld id="{E8525A89-689F-E248-999B-DA0E23F9BD73}" type="datetime1">
               <a:rPr lang="en-US" smtClean="0"/>
-              <a:t>10/5/17</a:t>
+              <a:t>10/12/17</a:t>
             </a:fld>
             <a:endParaRPr lang="en-US"/>
           </a:p>
@@ -2643,7 +2730,7 @@
             </a:pPr>
             <a:fld id="{F14BBFCB-94D2-F142-9C3C-128D87A444A9}" type="datetime1">
               <a:rPr lang="en-US" smtClean="0"/>
-              <a:t>10/5/17</a:t>
+              <a:t>10/12/17</a:t>
             </a:fld>
             <a:endParaRPr lang="en-US"/>
           </a:p>
@@ -2784,7 +2871,7 @@
             </a:pPr>
             <a:fld id="{DDC42C2F-8B03-DE47-AB78-2D40556B8605}" type="datetime1">
               <a:rPr lang="en-US" smtClean="0"/>
-              <a:t>10/5/17</a:t>
+              <a:t>10/12/17</a:t>
             </a:fld>
             <a:endParaRPr lang="en-US"/>
           </a:p>
@@ -2902,7 +2989,7 @@
             </a:pPr>
             <a:fld id="{E0CE8B53-0B43-DF42-BFD6-4C3E75C5AE2E}" type="datetime1">
               <a:rPr lang="en-US" smtClean="0"/>
-              <a:t>10/5/17</a:t>
+              <a:t>10/12/17</a:t>
             </a:fld>
             <a:endParaRPr lang="en-US"/>
           </a:p>
@@ -3202,7 +3289,7 @@
             </a:pPr>
             <a:fld id="{970D9060-9D68-E642-AE0C-12C07E983815}" type="datetime1">
               <a:rPr lang="en-US" smtClean="0"/>
-              <a:t>10/5/17</a:t>
+              <a:t>10/12/17</a:t>
             </a:fld>
             <a:endParaRPr lang="en-US"/>
           </a:p>
@@ -3481,7 +3568,7 @@
             </a:pPr>
             <a:fld id="{25E772C0-0767-274F-98AA-2732DB727804}" type="datetime1">
               <a:rPr lang="en-US" smtClean="0"/>
-              <a:t>10/5/17</a:t>
+              <a:t>10/12/17</a:t>
             </a:fld>
             <a:endParaRPr lang="en-US"/>
           </a:p>
@@ -3732,7 +3819,7 @@
             </a:pPr>
             <a:fld id="{AEF8DF09-B25A-0B45-AE28-1DFE814E894E}" type="datetime1">
               <a:rPr lang="en-US" smtClean="0"/>
-              <a:t>10/5/17</a:t>
+              <a:t>10/12/17</a:t>
             </a:fld>
             <a:endParaRPr lang="en-US"/>
           </a:p>
@@ -4448,7 +4535,6 @@
               <a:rPr lang="en-US" dirty="0" smtClean="0"/>
               <a:t>COMBINE, October 2017</a:t>
             </a:r>
-            <a:endParaRPr lang="en-US" dirty="0" smtClean="0"/>
           </a:p>
           <a:p>
             <a:endParaRPr lang="en-US" dirty="0"/>
@@ -4819,6 +4905,13 @@
   <p:clrMapOvr>
     <a:masterClrMapping/>
   </p:clrMapOvr>
+  <p:timing>
+    <p:tnLst>
+      <p:par>
+        <p:cTn id="1" dur="indefinite" restart="never" nodeType="tmRoot"/>
+      </p:par>
+    </p:tnLst>
+  </p:timing>
 </p:sld>
 </file>
 
@@ -4855,6 +4948,854 @@
           <a:lstStyle/>
           <a:p>
             <a:r>
+              <a:rPr lang="en-GB" dirty="0" smtClean="0"/>
+              <a:t>Hot off the press</a:t>
+            </a:r>
+            <a:endParaRPr lang="en-GB" dirty="0"/>
+          </a:p>
+        </p:txBody>
+      </p:sp>
+      <p:sp>
+        <p:nvSpPr>
+          <p:cNvPr id="3" name="Content Placeholder 2"/>
+          <p:cNvSpPr>
+            <a:spLocks noGrp="1"/>
+          </p:cNvSpPr>
+          <p:nvPr>
+            <p:ph idx="1"/>
+          </p:nvPr>
+        </p:nvSpPr>
+        <p:spPr>
+          <a:xfrm>
+            <a:off x="457200" y="1600200"/>
+            <a:ext cx="6191101" cy="4525963"/>
+          </a:xfrm>
+        </p:spPr>
+        <p:txBody>
+          <a:bodyPr/>
+          <a:lstStyle/>
+          <a:p>
+            <a:r>
+              <a:rPr lang="en-GB" sz="2400" b="1" dirty="0" smtClean="0"/>
+              <a:t>This week (SEP V004):</a:t>
+            </a:r>
+          </a:p>
+          <a:p>
+            <a:r>
+              <a:rPr lang="en-GB" dirty="0" smtClean="0"/>
+              <a:t>Aptamer </a:t>
+            </a:r>
+            <a:r>
+              <a:rPr lang="en-GB" dirty="0" smtClean="0"/>
+              <a:t>glyph</a:t>
+            </a:r>
+            <a:r>
+              <a:rPr lang="en-GB" dirty="0"/>
+              <a:t> </a:t>
+            </a:r>
+            <a:r>
+              <a:rPr lang="en-GB" dirty="0" smtClean="0"/>
+              <a:t>accepted</a:t>
+            </a:r>
+            <a:endParaRPr lang="en-GB" dirty="0"/>
+          </a:p>
+          <a:p>
+            <a:r>
+              <a:rPr lang="en-GB" dirty="0" smtClean="0"/>
+              <a:t>ORI-T </a:t>
+            </a:r>
+            <a:r>
+              <a:rPr lang="en-GB" dirty="0" smtClean="0"/>
+              <a:t>glyph accepted</a:t>
+            </a:r>
+            <a:endParaRPr lang="en-GB" dirty="0"/>
+          </a:p>
+          <a:p>
+            <a:r>
+              <a:rPr lang="en-GB" dirty="0" err="1" smtClean="0"/>
+              <a:t>polyA</a:t>
+            </a:r>
+            <a:r>
+              <a:rPr lang="en-GB" dirty="0" smtClean="0"/>
+              <a:t> </a:t>
+            </a:r>
+            <a:r>
+              <a:rPr lang="en-GB" dirty="0"/>
+              <a:t>Site </a:t>
+            </a:r>
+            <a:r>
+              <a:rPr lang="en-GB" dirty="0" smtClean="0"/>
+              <a:t>glyph accepted</a:t>
+            </a:r>
+            <a:endParaRPr lang="en-GB" dirty="0"/>
+          </a:p>
+          <a:p>
+            <a:r>
+              <a:rPr lang="en-GB" dirty="0" smtClean="0"/>
+              <a:t>Specific </a:t>
+            </a:r>
+            <a:r>
+              <a:rPr lang="en-GB" dirty="0" smtClean="0"/>
+              <a:t>Recombination </a:t>
+            </a:r>
+            <a:r>
+              <a:rPr lang="en-GB" dirty="0"/>
+              <a:t>Site </a:t>
+            </a:r>
+            <a:r>
+              <a:rPr lang="en-GB" dirty="0" smtClean="0"/>
+              <a:t>glyph </a:t>
+            </a:r>
+            <a:r>
+              <a:rPr lang="en-GB" dirty="0" smtClean="0"/>
+              <a:t>accepted</a:t>
+            </a:r>
+          </a:p>
+          <a:p>
+            <a:endParaRPr lang="en-GB" dirty="0" smtClean="0"/>
+          </a:p>
+          <a:p>
+            <a:r>
+              <a:rPr lang="en-GB" dirty="0"/>
+              <a:t>Debate continues on non-coding RNA </a:t>
+            </a:r>
+            <a:r>
+              <a:rPr lang="en-GB" dirty="0" smtClean="0"/>
+              <a:t>gene</a:t>
+            </a:r>
+            <a:endParaRPr lang="en-GB" dirty="0"/>
+          </a:p>
+        </p:txBody>
+      </p:sp>
+      <p:pic>
+        <p:nvPicPr>
+          <p:cNvPr id="17" name="Picture 16"/>
+          <p:cNvPicPr>
+            <a:picLocks noChangeAspect="1"/>
+          </p:cNvPicPr>
+          <p:nvPr/>
+        </p:nvPicPr>
+        <p:blipFill>
+          <a:blip r:embed="rId2"/>
+          <a:stretch>
+            <a:fillRect/>
+          </a:stretch>
+        </p:blipFill>
+        <p:spPr>
+          <a:xfrm>
+            <a:off x="6697779" y="1576588"/>
+            <a:ext cx="830781" cy="830781"/>
+          </a:xfrm>
+          <a:prstGeom prst="rect">
+            <a:avLst/>
+          </a:prstGeom>
+        </p:spPr>
+      </p:pic>
+      <p:pic>
+        <p:nvPicPr>
+          <p:cNvPr id="21" name="Picture 20"/>
+          <p:cNvPicPr>
+            <a:picLocks noChangeAspect="1"/>
+          </p:cNvPicPr>
+          <p:nvPr/>
+        </p:nvPicPr>
+        <p:blipFill>
+          <a:blip r:embed="rId3"/>
+          <a:stretch>
+            <a:fillRect/>
+          </a:stretch>
+        </p:blipFill>
+        <p:spPr>
+          <a:xfrm>
+            <a:off x="7712672" y="3712219"/>
+            <a:ext cx="942415" cy="483608"/>
+          </a:xfrm>
+          <a:prstGeom prst="rect">
+            <a:avLst/>
+          </a:prstGeom>
+        </p:spPr>
+      </p:pic>
+      <p:pic>
+        <p:nvPicPr>
+          <p:cNvPr id="22" name="Picture 21"/>
+          <p:cNvPicPr>
+            <a:picLocks noChangeAspect="1"/>
+          </p:cNvPicPr>
+          <p:nvPr/>
+        </p:nvPicPr>
+        <p:blipFill>
+          <a:blip r:embed="rId4"/>
+          <a:stretch>
+            <a:fillRect/>
+          </a:stretch>
+        </p:blipFill>
+        <p:spPr>
+          <a:xfrm>
+            <a:off x="7764780" y="2420737"/>
+            <a:ext cx="838200" cy="551447"/>
+          </a:xfrm>
+          <a:prstGeom prst="rect">
+            <a:avLst/>
+          </a:prstGeom>
+        </p:spPr>
+      </p:pic>
+      <p:pic>
+        <p:nvPicPr>
+          <p:cNvPr id="24" name="Picture 23"/>
+          <p:cNvPicPr>
+            <a:picLocks noChangeAspect="1"/>
+          </p:cNvPicPr>
+          <p:nvPr/>
+        </p:nvPicPr>
+        <p:blipFill>
+          <a:blip r:embed="rId5"/>
+          <a:stretch>
+            <a:fillRect/>
+          </a:stretch>
+        </p:blipFill>
+        <p:spPr>
+          <a:xfrm>
+            <a:off x="6646033" y="2856220"/>
+            <a:ext cx="934272" cy="934272"/>
+          </a:xfrm>
+          <a:prstGeom prst="rect">
+            <a:avLst/>
+          </a:prstGeom>
+        </p:spPr>
+      </p:pic>
+      <p:pic>
+        <p:nvPicPr>
+          <p:cNvPr id="8" name="Picture 7"/>
+          <p:cNvPicPr>
+            <a:picLocks noChangeAspect="1"/>
+          </p:cNvPicPr>
+          <p:nvPr/>
+        </p:nvPicPr>
+        <p:blipFill>
+          <a:blip r:embed="rId6"/>
+          <a:stretch>
+            <a:fillRect/>
+          </a:stretch>
+        </p:blipFill>
+        <p:spPr>
+          <a:xfrm>
+            <a:off x="6760172" y="5231601"/>
+            <a:ext cx="1905000" cy="444500"/>
+          </a:xfrm>
+          <a:prstGeom prst="rect">
+            <a:avLst/>
+          </a:prstGeom>
+        </p:spPr>
+      </p:pic>
+      <p:pic>
+        <p:nvPicPr>
+          <p:cNvPr id="9" name="Picture 8"/>
+          <p:cNvPicPr>
+            <a:picLocks noChangeAspect="1"/>
+          </p:cNvPicPr>
+          <p:nvPr/>
+        </p:nvPicPr>
+        <p:blipFill>
+          <a:blip r:embed="rId7"/>
+          <a:stretch>
+            <a:fillRect/>
+          </a:stretch>
+        </p:blipFill>
+        <p:spPr>
+          <a:xfrm>
+            <a:off x="6760172" y="5773891"/>
+            <a:ext cx="1905000" cy="457200"/>
+          </a:xfrm>
+          <a:prstGeom prst="rect">
+            <a:avLst/>
+          </a:prstGeom>
+        </p:spPr>
+      </p:pic>
+      <p:sp>
+        <p:nvSpPr>
+          <p:cNvPr id="10" name="TextBox 9"/>
+          <p:cNvSpPr txBox="1"/>
+          <p:nvPr/>
+        </p:nvSpPr>
+        <p:spPr>
+          <a:xfrm>
+            <a:off x="6557548" y="4751196"/>
+            <a:ext cx="2310248" cy="369332"/>
+          </a:xfrm>
+          <a:prstGeom prst="rect">
+            <a:avLst/>
+          </a:prstGeom>
+          <a:noFill/>
+        </p:spPr>
+        <p:txBody>
+          <a:bodyPr wrap="none" rtlCol="0">
+            <a:spAutoFit/>
+          </a:bodyPr>
+          <a:lstStyle/>
+          <a:p>
+            <a:r>
+              <a:rPr lang="en-US" dirty="0" smtClean="0"/>
+              <a:t>Non-Coding RNA Gene</a:t>
+            </a:r>
+            <a:endParaRPr lang="en-US" dirty="0"/>
+          </a:p>
+        </p:txBody>
+      </p:sp>
+    </p:spTree>
+    <p:extLst>
+      <p:ext uri="{BB962C8B-B14F-4D97-AF65-F5344CB8AC3E}">
+        <p14:creationId xmlns:p14="http://schemas.microsoft.com/office/powerpoint/2010/main" val="611834288"/>
+      </p:ext>
+    </p:extLst>
+  </p:cSld>
+  <p:clrMapOvr>
+    <a:masterClrMapping/>
+  </p:clrMapOvr>
+</p:sld>
+</file>
+
+<file path=ppt/slides/slide12.xml><?xml version="1.0" encoding="utf-8"?>
+<p:sld xmlns:a="http://schemas.openxmlformats.org/drawingml/2006/main" xmlns:r="http://schemas.openxmlformats.org/officeDocument/2006/relationships" xmlns:p="http://schemas.openxmlformats.org/presentationml/2006/main">
+  <p:cSld>
+    <p:spTree>
+      <p:nvGrpSpPr>
+        <p:cNvPr id="1" name=""/>
+        <p:cNvGrpSpPr/>
+        <p:nvPr/>
+      </p:nvGrpSpPr>
+      <p:grpSpPr>
+        <a:xfrm>
+          <a:off x="0" y="0"/>
+          <a:ext cx="0" cy="0"/>
+          <a:chOff x="0" y="0"/>
+          <a:chExt cx="0" cy="0"/>
+        </a:xfrm>
+      </p:grpSpPr>
+      <p:cxnSp>
+        <p:nvCxnSpPr>
+          <p:cNvPr id="9" name="Straight Connector 8"/>
+          <p:cNvCxnSpPr/>
+          <p:nvPr/>
+        </p:nvCxnSpPr>
+        <p:spPr>
+          <a:xfrm flipV="1">
+            <a:off x="5410200" y="2595563"/>
+            <a:ext cx="1569720" cy="15240"/>
+          </a:xfrm>
+          <a:prstGeom prst="line">
+            <a:avLst/>
+          </a:prstGeom>
+        </p:spPr>
+        <p:style>
+          <a:lnRef idx="2">
+            <a:schemeClr val="accent1"/>
+          </a:lnRef>
+          <a:fillRef idx="0">
+            <a:schemeClr val="accent1"/>
+          </a:fillRef>
+          <a:effectRef idx="1">
+            <a:schemeClr val="accent1"/>
+          </a:effectRef>
+          <a:fontRef idx="minor">
+            <a:schemeClr val="tx1"/>
+          </a:fontRef>
+        </p:style>
+      </p:cxnSp>
+      <p:cxnSp>
+        <p:nvCxnSpPr>
+          <p:cNvPr id="5" name="Straight Connector 4"/>
+          <p:cNvCxnSpPr/>
+          <p:nvPr/>
+        </p:nvCxnSpPr>
+        <p:spPr>
+          <a:xfrm flipV="1">
+            <a:off x="7239000" y="2583180"/>
+            <a:ext cx="1569720" cy="15240"/>
+          </a:xfrm>
+          <a:prstGeom prst="line">
+            <a:avLst/>
+          </a:prstGeom>
+        </p:spPr>
+        <p:style>
+          <a:lnRef idx="2">
+            <a:schemeClr val="accent1"/>
+          </a:lnRef>
+          <a:fillRef idx="0">
+            <a:schemeClr val="accent1"/>
+          </a:fillRef>
+          <a:effectRef idx="1">
+            <a:schemeClr val="accent1"/>
+          </a:effectRef>
+          <a:fontRef idx="minor">
+            <a:schemeClr val="tx1"/>
+          </a:fontRef>
+        </p:style>
+      </p:cxnSp>
+      <p:sp>
+        <p:nvSpPr>
+          <p:cNvPr id="2" name="Title 1"/>
+          <p:cNvSpPr>
+            <a:spLocks noGrp="1"/>
+          </p:cNvSpPr>
+          <p:nvPr>
+            <p:ph type="title"/>
+          </p:nvPr>
+        </p:nvSpPr>
+        <p:spPr/>
+        <p:txBody>
+          <a:bodyPr/>
+          <a:lstStyle/>
+          <a:p>
+            <a:r>
+              <a:rPr lang="en-GB" dirty="0" smtClean="0"/>
+              <a:t>Hot off the press</a:t>
+            </a:r>
+            <a:endParaRPr lang="en-GB" dirty="0"/>
+          </a:p>
+        </p:txBody>
+      </p:sp>
+      <p:sp>
+        <p:nvSpPr>
+          <p:cNvPr id="3" name="Content Placeholder 2"/>
+          <p:cNvSpPr>
+            <a:spLocks noGrp="1"/>
+          </p:cNvSpPr>
+          <p:nvPr>
+            <p:ph idx="1"/>
+          </p:nvPr>
+        </p:nvSpPr>
+        <p:spPr>
+          <a:xfrm>
+            <a:off x="457200" y="1600200"/>
+            <a:ext cx="5371463" cy="4525963"/>
+          </a:xfrm>
+        </p:spPr>
+        <p:txBody>
+          <a:bodyPr/>
+          <a:lstStyle/>
+          <a:p>
+            <a:r>
+              <a:rPr lang="en-GB" sz="2400" b="1" dirty="0" smtClean="0"/>
+              <a:t>This week (SEP V005):</a:t>
+            </a:r>
+          </a:p>
+          <a:p>
+            <a:r>
+              <a:rPr lang="en-GB" sz="2000" dirty="0" smtClean="0"/>
+              <a:t>Scar Glyph alignment accepted</a:t>
+            </a:r>
+          </a:p>
+          <a:p>
+            <a:r>
+              <a:rPr lang="en-GB" sz="2000" dirty="0" smtClean="0"/>
+              <a:t>Coding sequence glyph &amp; alternative</a:t>
+            </a:r>
+          </a:p>
+          <a:p>
+            <a:pPr lvl="1"/>
+            <a:r>
+              <a:rPr lang="en-GB" sz="1600" dirty="0" smtClean="0"/>
+              <a:t>alignment to middle</a:t>
+            </a:r>
+          </a:p>
+          <a:p>
+            <a:r>
+              <a:rPr lang="en-GB" sz="2000" dirty="0" smtClean="0"/>
+              <a:t>Restriction </a:t>
+            </a:r>
+            <a:r>
+              <a:rPr lang="en-GB" sz="2000" dirty="0" smtClean="0"/>
+              <a:t>site alignment </a:t>
+            </a:r>
+            <a:r>
+              <a:rPr lang="en-GB" sz="2000" dirty="0" smtClean="0"/>
+              <a:t>accepted</a:t>
+            </a:r>
+          </a:p>
+          <a:p>
+            <a:r>
+              <a:rPr lang="en-GB" sz="2000" dirty="0" smtClean="0"/>
+              <a:t>Overhang and sticky restriction site </a:t>
+            </a:r>
+            <a:r>
+              <a:rPr lang="en-GB" sz="2000" dirty="0"/>
+              <a:t>alignment accepted</a:t>
+            </a:r>
+            <a:endParaRPr lang="en-GB" sz="2000" dirty="0" smtClean="0"/>
+          </a:p>
+          <a:p>
+            <a:r>
+              <a:rPr lang="en-GB" sz="2000" dirty="0"/>
+              <a:t>I</a:t>
+            </a:r>
+            <a:r>
+              <a:rPr lang="en-GB" sz="2000" dirty="0" smtClean="0"/>
+              <a:t>nterior </a:t>
+            </a:r>
+            <a:r>
+              <a:rPr lang="en-GB" sz="2000" dirty="0"/>
+              <a:t>of the insulator glyph being defined as the </a:t>
+            </a:r>
+            <a:r>
+              <a:rPr lang="en-GB" sz="2000" dirty="0" smtClean="0"/>
+              <a:t>inner &amp; alignment accepted</a:t>
+            </a:r>
+          </a:p>
+          <a:p>
+            <a:r>
+              <a:rPr lang="en-GB" sz="2000" dirty="0" smtClean="0"/>
+              <a:t>New operator glyph </a:t>
+            </a:r>
+            <a:r>
+              <a:rPr lang="en-GB" sz="2000" dirty="0" smtClean="0"/>
+              <a:t>accepted</a:t>
+            </a:r>
+            <a:endParaRPr lang="en-GB" sz="2000" dirty="0" smtClean="0"/>
+          </a:p>
+          <a:p>
+            <a:r>
+              <a:rPr lang="en-GB" sz="2000" dirty="0" smtClean="0"/>
+              <a:t>Origin </a:t>
+            </a:r>
+            <a:r>
+              <a:rPr lang="en-GB" sz="2000" dirty="0"/>
+              <a:t>alignment accepted </a:t>
+            </a:r>
+            <a:endParaRPr lang="en-GB" sz="2000" dirty="0" smtClean="0"/>
+          </a:p>
+          <a:p>
+            <a:r>
+              <a:rPr lang="en-GB" sz="2000" dirty="0" smtClean="0"/>
+              <a:t>User defined </a:t>
+            </a:r>
+            <a:r>
+              <a:rPr lang="en-GB" sz="2000" dirty="0" smtClean="0"/>
+              <a:t>alignment accepted</a:t>
+            </a:r>
+            <a:endParaRPr lang="en-GB" sz="2000" dirty="0" smtClean="0"/>
+          </a:p>
+        </p:txBody>
+      </p:sp>
+      <p:pic>
+        <p:nvPicPr>
+          <p:cNvPr id="1026" name="Picture 2" descr="https://raw.githubusercontent.com/SynBioDex/SBOLv-realizations/1eb9426/Glyphs/assembly-scar/assembly-scar-specification-covering-doublestrand.png"/>
+          <p:cNvPicPr>
+            <a:picLocks noChangeAspect="1" noChangeArrowheads="1"/>
+          </p:cNvPicPr>
+          <p:nvPr/>
+        </p:nvPicPr>
+        <p:blipFill>
+          <a:blip r:embed="rId2">
+            <a:extLst>
+              <a:ext uri="{28A0092B-C50C-407E-A947-70E740481C1C}">
+                <a14:useLocalDpi xmlns:a14="http://schemas.microsoft.com/office/drawing/2010/main" val="0"/>
+              </a:ext>
+            </a:extLst>
+          </a:blip>
+          <a:srcRect/>
+          <a:stretch>
+            <a:fillRect/>
+          </a:stretch>
+        </p:blipFill>
+        <p:spPr bwMode="auto">
+          <a:xfrm>
+            <a:off x="6685915" y="1921191"/>
+            <a:ext cx="1025525" cy="251288"/>
+          </a:xfrm>
+          <a:prstGeom prst="rect">
+            <a:avLst/>
+          </a:prstGeom>
+          <a:noFill/>
+          <a:extLst>
+            <a:ext uri="{909E8E84-426E-40DD-AFC4-6F175D3DCCD1}">
+              <a14:hiddenFill xmlns:a14="http://schemas.microsoft.com/office/drawing/2010/main">
+                <a:solidFill>
+                  <a:srgbClr val="FFFFFF"/>
+                </a:solidFill>
+              </a14:hiddenFill>
+            </a:ext>
+          </a:extLst>
+        </p:spPr>
+      </p:pic>
+      <p:pic>
+        <p:nvPicPr>
+          <p:cNvPr id="1028" name="Picture 4" descr="cds-specification-arrow.png (127×87)"/>
+          <p:cNvPicPr>
+            <a:picLocks noChangeAspect="1" noChangeArrowheads="1"/>
+          </p:cNvPicPr>
+          <p:nvPr/>
+        </p:nvPicPr>
+        <p:blipFill>
+          <a:blip r:embed="rId3">
+            <a:extLst>
+              <a:ext uri="{28A0092B-C50C-407E-A947-70E740481C1C}">
+                <a14:useLocalDpi xmlns:a14="http://schemas.microsoft.com/office/drawing/2010/main" val="0"/>
+              </a:ext>
+            </a:extLst>
+          </a:blip>
+          <a:srcRect/>
+          <a:stretch>
+            <a:fillRect/>
+          </a:stretch>
+        </p:blipFill>
+        <p:spPr bwMode="auto">
+          <a:xfrm>
+            <a:off x="7661275" y="2326957"/>
+            <a:ext cx="796926" cy="545926"/>
+          </a:xfrm>
+          <a:prstGeom prst="rect">
+            <a:avLst/>
+          </a:prstGeom>
+          <a:noFill/>
+          <a:extLst>
+            <a:ext uri="{909E8E84-426E-40DD-AFC4-6F175D3DCCD1}">
+              <a14:hiddenFill xmlns:a14="http://schemas.microsoft.com/office/drawing/2010/main">
+                <a:solidFill>
+                  <a:srgbClr val="FFFFFF"/>
+                </a:solidFill>
+              </a14:hiddenFill>
+            </a:ext>
+          </a:extLst>
+        </p:spPr>
+      </p:pic>
+      <p:pic>
+        <p:nvPicPr>
+          <p:cNvPr id="8" name="Picture 7"/>
+          <p:cNvPicPr>
+            <a:picLocks noChangeAspect="1"/>
+          </p:cNvPicPr>
+          <p:nvPr/>
+        </p:nvPicPr>
+        <p:blipFill>
+          <a:blip r:embed="rId4"/>
+          <a:stretch>
+            <a:fillRect/>
+          </a:stretch>
+        </p:blipFill>
+        <p:spPr>
+          <a:xfrm>
+            <a:off x="5849191" y="2383434"/>
+            <a:ext cx="743808" cy="430626"/>
+          </a:xfrm>
+          <a:prstGeom prst="rect">
+            <a:avLst/>
+          </a:prstGeom>
+        </p:spPr>
+      </p:pic>
+      <p:pic>
+        <p:nvPicPr>
+          <p:cNvPr id="10" name="Picture 9"/>
+          <p:cNvPicPr>
+            <a:picLocks noChangeAspect="1"/>
+          </p:cNvPicPr>
+          <p:nvPr/>
+        </p:nvPicPr>
+        <p:blipFill>
+          <a:blip r:embed="rId5"/>
+          <a:stretch>
+            <a:fillRect/>
+          </a:stretch>
+        </p:blipFill>
+        <p:spPr>
+          <a:xfrm>
+            <a:off x="6710875" y="2854643"/>
+            <a:ext cx="788942" cy="506804"/>
+          </a:xfrm>
+          <a:prstGeom prst="rect">
+            <a:avLst/>
+          </a:prstGeom>
+        </p:spPr>
+      </p:pic>
+      <p:pic>
+        <p:nvPicPr>
+          <p:cNvPr id="11" name="Picture 10"/>
+          <p:cNvPicPr>
+            <a:picLocks noChangeAspect="1"/>
+          </p:cNvPicPr>
+          <p:nvPr/>
+        </p:nvPicPr>
+        <p:blipFill>
+          <a:blip r:embed="rId6"/>
+          <a:stretch>
+            <a:fillRect/>
+          </a:stretch>
+        </p:blipFill>
+        <p:spPr>
+          <a:xfrm>
+            <a:off x="5831838" y="3502328"/>
+            <a:ext cx="1083315" cy="320070"/>
+          </a:xfrm>
+          <a:prstGeom prst="rect">
+            <a:avLst/>
+          </a:prstGeom>
+        </p:spPr>
+      </p:pic>
+      <p:pic>
+        <p:nvPicPr>
+          <p:cNvPr id="15" name="Picture 14"/>
+          <p:cNvPicPr>
+            <a:picLocks noChangeAspect="1"/>
+          </p:cNvPicPr>
+          <p:nvPr/>
+        </p:nvPicPr>
+        <p:blipFill>
+          <a:blip r:embed="rId7"/>
+          <a:stretch>
+            <a:fillRect/>
+          </a:stretch>
+        </p:blipFill>
+        <p:spPr>
+          <a:xfrm>
+            <a:off x="7480000" y="3379687"/>
+            <a:ext cx="894380" cy="584562"/>
+          </a:xfrm>
+          <a:prstGeom prst="rect">
+            <a:avLst/>
+          </a:prstGeom>
+        </p:spPr>
+      </p:pic>
+      <p:pic>
+        <p:nvPicPr>
+          <p:cNvPr id="16" name="Picture 15"/>
+          <p:cNvPicPr>
+            <a:picLocks noChangeAspect="1"/>
+          </p:cNvPicPr>
+          <p:nvPr/>
+        </p:nvPicPr>
+        <p:blipFill>
+          <a:blip r:embed="rId8"/>
+          <a:stretch>
+            <a:fillRect/>
+          </a:stretch>
+        </p:blipFill>
+        <p:spPr>
+          <a:xfrm>
+            <a:off x="6763890" y="4073843"/>
+            <a:ext cx="586302" cy="435870"/>
+          </a:xfrm>
+          <a:prstGeom prst="rect">
+            <a:avLst/>
+          </a:prstGeom>
+        </p:spPr>
+      </p:pic>
+      <p:pic>
+        <p:nvPicPr>
+          <p:cNvPr id="18" name="Picture 17"/>
+          <p:cNvPicPr>
+            <a:picLocks noChangeAspect="1"/>
+          </p:cNvPicPr>
+          <p:nvPr/>
+        </p:nvPicPr>
+        <p:blipFill>
+          <a:blip r:embed="rId9"/>
+          <a:stretch>
+            <a:fillRect/>
+          </a:stretch>
+        </p:blipFill>
+        <p:spPr>
+          <a:xfrm>
+            <a:off x="6748649" y="4634468"/>
+            <a:ext cx="644810" cy="335132"/>
+          </a:xfrm>
+          <a:prstGeom prst="rect">
+            <a:avLst/>
+          </a:prstGeom>
+        </p:spPr>
+      </p:pic>
+      <p:pic>
+        <p:nvPicPr>
+          <p:cNvPr id="19" name="Picture 18"/>
+          <p:cNvPicPr>
+            <a:picLocks noChangeAspect="1"/>
+          </p:cNvPicPr>
+          <p:nvPr/>
+        </p:nvPicPr>
+        <p:blipFill>
+          <a:blip r:embed="rId10"/>
+          <a:stretch>
+            <a:fillRect/>
+          </a:stretch>
+        </p:blipFill>
+        <p:spPr>
+          <a:xfrm>
+            <a:off x="6777878" y="5071670"/>
+            <a:ext cx="592721" cy="358752"/>
+          </a:xfrm>
+          <a:prstGeom prst="rect">
+            <a:avLst/>
+          </a:prstGeom>
+        </p:spPr>
+      </p:pic>
+      <p:pic>
+        <p:nvPicPr>
+          <p:cNvPr id="20" name="Picture 19"/>
+          <p:cNvPicPr>
+            <a:picLocks noChangeAspect="1"/>
+          </p:cNvPicPr>
+          <p:nvPr/>
+        </p:nvPicPr>
+        <p:blipFill>
+          <a:blip r:embed="rId11"/>
+          <a:stretch>
+            <a:fillRect/>
+          </a:stretch>
+        </p:blipFill>
+        <p:spPr>
+          <a:xfrm>
+            <a:off x="6685915" y="5572459"/>
+            <a:ext cx="833099" cy="344580"/>
+          </a:xfrm>
+          <a:prstGeom prst="rect">
+            <a:avLst/>
+          </a:prstGeom>
+        </p:spPr>
+      </p:pic>
+    </p:spTree>
+    <p:extLst>
+      <p:ext uri="{BB962C8B-B14F-4D97-AF65-F5344CB8AC3E}">
+        <p14:creationId xmlns:p14="http://schemas.microsoft.com/office/powerpoint/2010/main" val="2654412156"/>
+      </p:ext>
+    </p:extLst>
+  </p:cSld>
+  <p:clrMapOvr>
+    <a:masterClrMapping/>
+  </p:clrMapOvr>
+</p:sld>
+</file>
+
+<file path=ppt/slides/slide13.xml><?xml version="1.0" encoding="utf-8"?>
+<p:sld xmlns:a="http://schemas.openxmlformats.org/drawingml/2006/main" xmlns:r="http://schemas.openxmlformats.org/officeDocument/2006/relationships" xmlns:p="http://schemas.openxmlformats.org/presentationml/2006/main">
+  <p:cSld>
+    <p:spTree>
+      <p:nvGrpSpPr>
+        <p:cNvPr id="1" name=""/>
+        <p:cNvGrpSpPr/>
+        <p:nvPr/>
+      </p:nvGrpSpPr>
+      <p:grpSpPr>
+        <a:xfrm>
+          <a:off x="0" y="0"/>
+          <a:ext cx="0" cy="0"/>
+          <a:chOff x="0" y="0"/>
+          <a:chExt cx="0" cy="0"/>
+        </a:xfrm>
+      </p:grpSpPr>
+      <p:sp>
+        <p:nvSpPr>
+          <p:cNvPr id="2" name="Title 1"/>
+          <p:cNvSpPr>
+            <a:spLocks noGrp="1"/>
+          </p:cNvSpPr>
+          <p:nvPr>
+            <p:ph type="title"/>
+          </p:nvPr>
+        </p:nvSpPr>
+        <p:spPr/>
+        <p:txBody>
+          <a:bodyPr/>
+          <a:lstStyle/>
+          <a:p>
+            <a:r>
               <a:rPr lang="en-US" dirty="0" smtClean="0"/>
               <a:t>Next steps</a:t>
             </a:r>
@@ -4951,6 +5892,13 @@
   <p:clrMapOvr>
     <a:masterClrMapping/>
   </p:clrMapOvr>
+  <p:timing>
+    <p:tnLst>
+      <p:par>
+        <p:cTn id="1" dur="indefinite" restart="never" nodeType="tmRoot"/>
+      </p:par>
+    </p:tnLst>
+  </p:timing>
 </p:sld>
 </file>
 
@@ -5012,7 +5960,15 @@
           <a:p>
             <a:r>
               <a:rPr lang="en-US" sz="2800" dirty="0"/>
-              <a:t>Problem: Communicating Gene Constructs</a:t>
+              <a:t>Problem: Communicating </a:t>
+            </a:r>
+            <a:r>
+              <a:rPr lang="en-US" sz="2800" dirty="0" smtClean="0"/>
+              <a:t>Genetic </a:t>
+            </a:r>
+            <a:r>
+              <a:rPr lang="en-US" sz="2800" dirty="0"/>
+              <a:t>Constructs</a:t>
             </a:r>
           </a:p>
         </p:txBody>
@@ -5447,11 +6403,7 @@
           <a:p>
             <a:r>
               <a:rPr lang="en-US" dirty="0" smtClean="0"/>
-              <a:t>Elements of SBOL </a:t>
-            </a:r>
-            <a:r>
-              <a:rPr lang="en-US" dirty="0" smtClean="0"/>
-              <a:t>Visual (1.0 </a:t>
+              <a:t>Elements of SBOL Visual (1.0 </a:t>
             </a:r>
             <a:r>
               <a:rPr lang="en-US" dirty="0" smtClean="0">
@@ -7535,6 +8487,13 @@
   <p:clrMapOvr>
     <a:masterClrMapping/>
   </p:clrMapOvr>
+  <p:timing>
+    <p:tnLst>
+      <p:par>
+        <p:cTn id="1" dur="indefinite" restart="never" nodeType="tmRoot"/>
+      </p:par>
+    </p:tnLst>
+  </p:timing>
 </p:sld>
 </file>
 
@@ -8161,6 +9120,13 @@
   <p:clrMapOvr>
     <a:masterClrMapping/>
   </p:clrMapOvr>
+  <p:timing>
+    <p:tnLst>
+      <p:par>
+        <p:cTn id="1" dur="indefinite" restart="never" nodeType="tmRoot"/>
+      </p:par>
+    </p:tnLst>
+  </p:timing>
 </p:sld>
 </file>
 
@@ -8658,6 +9624,13 @@
   <p:clrMapOvr>
     <a:masterClrMapping/>
   </p:clrMapOvr>
+  <p:timing>
+    <p:tnLst>
+      <p:par>
+        <p:cTn id="1" dur="indefinite" restart="never" nodeType="tmRoot"/>
+      </p:par>
+    </p:tnLst>
+  </p:timing>
 </p:sld>
 </file>
 
@@ -9175,6 +10148,13 @@
   <p:clrMapOvr>
     <a:masterClrMapping/>
   </p:clrMapOvr>
+  <p:timing>
+    <p:tnLst>
+      <p:par>
+        <p:cTn id="1" dur="indefinite" restart="never" nodeType="tmRoot"/>
+      </p:par>
+    </p:tnLst>
+  </p:timing>
 </p:sld>
 </file>
 

</xml_diff>